<commit_message>
updated code screenshots with syntax highlighting
</commit_message>
<xml_diff>
--- a/ICT technology.pptx
+++ b/ICT technology.pptx
@@ -118,6 +118,11 @@
       </a:defRPr>
     </a:lvl9pPr>
   </p:defaultTextStyle>
+  <p:extLst>
+    <p:ext uri="{EFAFB233-063F-42B5-8137-9DF3F51BA10A}">
+      <p15:sldGuideLst xmlns:p15="http://schemas.microsoft.com/office/powerpoint/2012/main"/>
+    </p:ext>
+  </p:extLst>
 </p:presentation>
 </file>
 
@@ -3504,10 +3509,10 @@
       </p:sp>
       <p:pic>
         <p:nvPicPr>
-          <p:cNvPr id="5" name="Picture 4">
-            <a:extLst>
-              <a:ext uri="{FF2B5EF4-FFF2-40B4-BE49-F238E27FC236}">
-                <a16:creationId xmlns:a16="http://schemas.microsoft.com/office/drawing/2014/main" id="{5B88F3C9-5B4F-ECC3-2E60-68B2957C6B7D}"/>
+          <p:cNvPr id="6" name="Picture 5">
+            <a:extLst>
+              <a:ext uri="{FF2B5EF4-FFF2-40B4-BE49-F238E27FC236}">
+                <a16:creationId xmlns:a16="http://schemas.microsoft.com/office/drawing/2014/main" id="{62015CB9-646E-9DAA-E78C-AB5A7E13445E}"/>
               </a:ext>
             </a:extLst>
           </p:cNvPr>
@@ -3524,8 +3529,8 @@
         </p:blipFill>
         <p:spPr>
           <a:xfrm>
-            <a:off x="994785" y="2947703"/>
-            <a:ext cx="10311058" cy="2298065"/>
+            <a:off x="838200" y="2548595"/>
+            <a:ext cx="10732785" cy="2093743"/>
           </a:xfrm>
           <a:prstGeom prst="rect">
             <a:avLst/>
@@ -3850,10 +3855,10 @@
       </p:sp>
       <p:pic>
         <p:nvPicPr>
-          <p:cNvPr id="5" name="Picture 4">
-            <a:extLst>
-              <a:ext uri="{FF2B5EF4-FFF2-40B4-BE49-F238E27FC236}">
-                <a16:creationId xmlns:a16="http://schemas.microsoft.com/office/drawing/2014/main" id="{A11BD1B2-B3C6-1793-FA2F-DC7A797158EC}"/>
+          <p:cNvPr id="6" name="Picture 5">
+            <a:extLst>
+              <a:ext uri="{FF2B5EF4-FFF2-40B4-BE49-F238E27FC236}">
+                <a16:creationId xmlns:a16="http://schemas.microsoft.com/office/drawing/2014/main" id="{E4341AFE-A202-D57D-0636-B74A0E53D6A6}"/>
               </a:ext>
             </a:extLst>
           </p:cNvPr>
@@ -3870,8 +3875,8 @@
         </p:blipFill>
         <p:spPr>
           <a:xfrm>
-            <a:off x="838199" y="1825625"/>
-            <a:ext cx="10528815" cy="2297196"/>
+            <a:off x="838200" y="1690688"/>
+            <a:ext cx="10761536" cy="1980980"/>
           </a:xfrm>
           <a:prstGeom prst="rect">
             <a:avLst/>
@@ -3966,10 +3971,10 @@
       </p:sp>
       <p:pic>
         <p:nvPicPr>
-          <p:cNvPr id="5" name="Picture 4">
-            <a:extLst>
-              <a:ext uri="{FF2B5EF4-FFF2-40B4-BE49-F238E27FC236}">
-                <a16:creationId xmlns:a16="http://schemas.microsoft.com/office/drawing/2014/main" id="{02AFA911-1723-D06F-07A5-7F5D2576E257}"/>
+          <p:cNvPr id="4" name="Picture 3">
+            <a:extLst>
+              <a:ext uri="{FF2B5EF4-FFF2-40B4-BE49-F238E27FC236}">
+                <a16:creationId xmlns:a16="http://schemas.microsoft.com/office/drawing/2014/main" id="{8EC86C2C-5B7E-6716-1928-CECB9B37BDEF}"/>
               </a:ext>
             </a:extLst>
           </p:cNvPr>
@@ -3986,8 +3991,8 @@
         </p:blipFill>
         <p:spPr>
           <a:xfrm>
-            <a:off x="3740415" y="1690688"/>
-            <a:ext cx="4418659" cy="4979985"/>
+            <a:off x="3216420" y="1370109"/>
+            <a:ext cx="5142621" cy="5122766"/>
           </a:xfrm>
           <a:prstGeom prst="rect">
             <a:avLst/>
@@ -4082,10 +4087,10 @@
       </p:sp>
       <p:pic>
         <p:nvPicPr>
-          <p:cNvPr id="4" name="Picture 3">
-            <a:extLst>
-              <a:ext uri="{FF2B5EF4-FFF2-40B4-BE49-F238E27FC236}">
-                <a16:creationId xmlns:a16="http://schemas.microsoft.com/office/drawing/2014/main" id="{72673BD0-CEE3-71F5-272F-F4B01105529E}"/>
+          <p:cNvPr id="5" name="Picture 4">
+            <a:extLst>
+              <a:ext uri="{FF2B5EF4-FFF2-40B4-BE49-F238E27FC236}">
+                <a16:creationId xmlns:a16="http://schemas.microsoft.com/office/drawing/2014/main" id="{D2DC7732-471E-7379-56E9-FBB9F664FE84}"/>
               </a:ext>
             </a:extLst>
           </p:cNvPr>
@@ -4102,8 +4107,8 @@
         </p:blipFill>
         <p:spPr>
           <a:xfrm>
-            <a:off x="622379" y="2229335"/>
-            <a:ext cx="10947242" cy="2996730"/>
+            <a:off x="838200" y="2038155"/>
+            <a:ext cx="10686612" cy="2561979"/>
           </a:xfrm>
           <a:prstGeom prst="rect">
             <a:avLst/>
@@ -4417,7 +4422,7 @@
           <a:p>
             <a:r>
               <a:rPr lang="en-US" dirty="0"/>
-              <a:t>Grab(num, num)</a:t>
+              <a:t>Grab(num, num, num)</a:t>
             </a:r>
           </a:p>
           <a:p>
@@ -4494,10 +4499,10 @@
       </p:sp>
       <p:pic>
         <p:nvPicPr>
-          <p:cNvPr id="7" name="Picture 6">
-            <a:extLst>
-              <a:ext uri="{FF2B5EF4-FFF2-40B4-BE49-F238E27FC236}">
-                <a16:creationId xmlns:a16="http://schemas.microsoft.com/office/drawing/2014/main" id="{CF46A353-96D2-7DD0-F839-1AD078BEAFC1}"/>
+          <p:cNvPr id="4" name="Picture 3">
+            <a:extLst>
+              <a:ext uri="{FF2B5EF4-FFF2-40B4-BE49-F238E27FC236}">
+                <a16:creationId xmlns:a16="http://schemas.microsoft.com/office/drawing/2014/main" id="{8243F044-ECAB-6C47-F753-0D5A895C0C01}"/>
               </a:ext>
             </a:extLst>
           </p:cNvPr>
@@ -4514,8 +4519,8 @@
         </p:blipFill>
         <p:spPr>
           <a:xfrm>
-            <a:off x="2858134" y="1690688"/>
-            <a:ext cx="6475731" cy="4327762"/>
+            <a:off x="2775003" y="1561515"/>
+            <a:ext cx="7530094" cy="4234374"/>
           </a:xfrm>
           <a:prstGeom prst="rect">
             <a:avLst/>
@@ -4616,10 +4621,10 @@
       </p:sp>
       <p:pic>
         <p:nvPicPr>
-          <p:cNvPr id="5" name="Picture 4">
-            <a:extLst>
-              <a:ext uri="{FF2B5EF4-FFF2-40B4-BE49-F238E27FC236}">
-                <a16:creationId xmlns:a16="http://schemas.microsoft.com/office/drawing/2014/main" id="{BAF8FEEA-1A89-65CD-2EC3-A7A3F7FA13F4}"/>
+          <p:cNvPr id="6" name="Picture 5">
+            <a:extLst>
+              <a:ext uri="{FF2B5EF4-FFF2-40B4-BE49-F238E27FC236}">
+                <a16:creationId xmlns:a16="http://schemas.microsoft.com/office/drawing/2014/main" id="{4F44E22A-5077-34DD-080D-39AD02C406A3}"/>
               </a:ext>
             </a:extLst>
           </p:cNvPr>
@@ -4636,8 +4641,8 @@
         </p:blipFill>
         <p:spPr>
           <a:xfrm>
-            <a:off x="4922359" y="1681758"/>
-            <a:ext cx="6431441" cy="4639072"/>
+            <a:off x="4922358" y="1945153"/>
+            <a:ext cx="6990951" cy="4231810"/>
           </a:xfrm>
           <a:prstGeom prst="rect">
             <a:avLst/>
@@ -4709,10 +4714,10 @@
       </p:sp>
       <p:pic>
         <p:nvPicPr>
-          <p:cNvPr id="5" name="Picture 4">
-            <a:extLst>
-              <a:ext uri="{FF2B5EF4-FFF2-40B4-BE49-F238E27FC236}">
-                <a16:creationId xmlns:a16="http://schemas.microsoft.com/office/drawing/2014/main" id="{754FEC58-438C-1958-49AF-1F1298DE5CA9}"/>
+          <p:cNvPr id="4" name="Picture 3">
+            <a:extLst>
+              <a:ext uri="{FF2B5EF4-FFF2-40B4-BE49-F238E27FC236}">
+                <a16:creationId xmlns:a16="http://schemas.microsoft.com/office/drawing/2014/main" id="{5071EAD5-5CE4-2AAA-AD6E-D6011A5A2B58}"/>
               </a:ext>
             </a:extLst>
           </p:cNvPr>
@@ -4729,8 +4734,8 @@
         </p:blipFill>
         <p:spPr>
           <a:xfrm>
-            <a:off x="1326518" y="2314858"/>
-            <a:ext cx="10027282" cy="2228284"/>
+            <a:off x="1570460" y="2487847"/>
+            <a:ext cx="9783340" cy="1882306"/>
           </a:xfrm>
           <a:prstGeom prst="rect">
             <a:avLst/>
@@ -4798,10 +4803,10 @@
       </p:sp>
       <p:pic>
         <p:nvPicPr>
-          <p:cNvPr id="5" name="Picture 4">
-            <a:extLst>
-              <a:ext uri="{FF2B5EF4-FFF2-40B4-BE49-F238E27FC236}">
-                <a16:creationId xmlns:a16="http://schemas.microsoft.com/office/drawing/2014/main" id="{B73575E9-AA5F-C73E-5523-1C579B60AB83}"/>
+          <p:cNvPr id="4" name="Picture 3">
+            <a:extLst>
+              <a:ext uri="{FF2B5EF4-FFF2-40B4-BE49-F238E27FC236}">
+                <a16:creationId xmlns:a16="http://schemas.microsoft.com/office/drawing/2014/main" id="{0ACCB639-2D39-2BB0-AAE0-B5B319516C1E}"/>
               </a:ext>
             </a:extLst>
           </p:cNvPr>
@@ -4818,8 +4823,8 @@
         </p:blipFill>
         <p:spPr>
           <a:xfrm>
-            <a:off x="1166972" y="1994512"/>
-            <a:ext cx="9858056" cy="2868975"/>
+            <a:off x="1646985" y="2518118"/>
+            <a:ext cx="8898029" cy="2138287"/>
           </a:xfrm>
           <a:prstGeom prst="rect">
             <a:avLst/>
@@ -4903,7 +4908,9 @@
         </p:nvSpPr>
         <p:spPr/>
         <p:txBody>
-          <a:bodyPr/>
+          <a:bodyPr>
+            <a:normAutofit/>
+          </a:bodyPr>
           <a:lstStyle/>
           <a:p>
             <a:r>
@@ -4952,21 +4959,8 @@
             </a:r>
             <a:r>
               <a:rPr lang="en-US" dirty="0"/>
-              <a:t> = x-</a:t>
-            </a:r>
-            <a:r>
-              <a:rPr lang="en-US" dirty="0" err="1"/>
-              <a:t>waarde</a:t>
-            </a:r>
-            <a:r>
-              <a:rPr lang="en-US" dirty="0"/>
-              <a:t> start </a:t>
-            </a:r>
-            <a:r>
-              <a:rPr lang="en-US" dirty="0" err="1"/>
-              <a:t>positie</a:t>
-            </a:r>
-            <a:endParaRPr lang="en-US" dirty="0"/>
+              <a:t> = spacing X axis between grid items</a:t>
+            </a:r>
           </a:p>
           <a:p>
             <a:r>
@@ -4975,15 +4969,7 @@
             </a:r>
             <a:r>
               <a:rPr lang="en-US" dirty="0"/>
-              <a:t> = y-</a:t>
-            </a:r>
-            <a:r>
-              <a:rPr lang="en-US" dirty="0" err="1"/>
-              <a:t>waarde</a:t>
-            </a:r>
-            <a:r>
-              <a:rPr lang="en-US" dirty="0"/>
-              <a:t> start positive</a:t>
+              <a:t> = spacing Y axis between grid items</a:t>
             </a:r>
           </a:p>
           <a:p>
@@ -5181,10 +5167,10 @@
       </p:sp>
       <p:pic>
         <p:nvPicPr>
-          <p:cNvPr id="7" name="Picture 6">
-            <a:extLst>
-              <a:ext uri="{FF2B5EF4-FFF2-40B4-BE49-F238E27FC236}">
-                <a16:creationId xmlns:a16="http://schemas.microsoft.com/office/drawing/2014/main" id="{B5E95888-44AF-B43C-1800-E995B4950A40}"/>
+          <p:cNvPr id="5" name="Picture 4">
+            <a:extLst>
+              <a:ext uri="{FF2B5EF4-FFF2-40B4-BE49-F238E27FC236}">
+                <a16:creationId xmlns:a16="http://schemas.microsoft.com/office/drawing/2014/main" id="{FCE1CCC2-9961-3F64-D3D5-E722057E0278}"/>
               </a:ext>
             </a:extLst>
           </p:cNvPr>
@@ -5201,8 +5187,8 @@
         </p:blipFill>
         <p:spPr>
           <a:xfrm>
-            <a:off x="838200" y="1766052"/>
-            <a:ext cx="10695208" cy="1766680"/>
+            <a:off x="952701" y="1462332"/>
+            <a:ext cx="10401099" cy="1442835"/>
           </a:xfrm>
           <a:prstGeom prst="rect">
             <a:avLst/>
@@ -5318,10 +5304,10 @@
       </p:sp>
       <p:pic>
         <p:nvPicPr>
-          <p:cNvPr id="5" name="Picture 4">
-            <a:extLst>
-              <a:ext uri="{FF2B5EF4-FFF2-40B4-BE49-F238E27FC236}">
-                <a16:creationId xmlns:a16="http://schemas.microsoft.com/office/drawing/2014/main" id="{2D3D95C0-FE27-B628-5B3E-6BBCF8C662DA}"/>
+          <p:cNvPr id="6" name="Picture 5">
+            <a:extLst>
+              <a:ext uri="{FF2B5EF4-FFF2-40B4-BE49-F238E27FC236}">
+                <a16:creationId xmlns:a16="http://schemas.microsoft.com/office/drawing/2014/main" id="{50BC5E3E-92F7-286D-595D-FF2E4BE6EFBF}"/>
               </a:ext>
             </a:extLst>
           </p:cNvPr>
@@ -5338,8 +5324,8 @@
         </p:blipFill>
         <p:spPr>
           <a:xfrm>
-            <a:off x="1030704" y="2488014"/>
-            <a:ext cx="8450179" cy="4188978"/>
+            <a:off x="1007598" y="2402478"/>
+            <a:ext cx="10176803" cy="4248901"/>
           </a:xfrm>
           <a:prstGeom prst="rect">
             <a:avLst/>

</xml_diff>